<commit_message>
Updated logo in PPT
</commit_message>
<xml_diff>
--- a/meetup-10-Apr-2025/Agentic workflow with SpringAI.pptx
+++ b/meetup-10-Apr-2025/Agentic workflow with SpringAI.pptx
@@ -11353,7 +11353,7 @@
           <a:p>
             <a:fld id="{5BCAD085-E8A6-8845-BD4E-CB4CCA059FC4}" type="datetimeFigureOut">
               <a:rPr lang="en-US" smtClean="0"/>
-              <a:t>4/10/25</a:t>
+              <a:t>4/11/25</a:t>
             </a:fld>
             <a:endParaRPr lang="en-US"/>
           </a:p>
@@ -11521,7 +11521,7 @@
           <a:p>
             <a:fld id="{5BCAD085-E8A6-8845-BD4E-CB4CCA059FC4}" type="datetimeFigureOut">
               <a:rPr lang="en-US" smtClean="0"/>
-              <a:t>4/10/25</a:t>
+              <a:t>4/11/25</a:t>
             </a:fld>
             <a:endParaRPr lang="en-US"/>
           </a:p>
@@ -11699,7 +11699,7 @@
           <a:p>
             <a:fld id="{5BCAD085-E8A6-8845-BD4E-CB4CCA059FC4}" type="datetimeFigureOut">
               <a:rPr lang="en-US" smtClean="0"/>
-              <a:t>4/10/25</a:t>
+              <a:t>4/11/25</a:t>
             </a:fld>
             <a:endParaRPr lang="en-US"/>
           </a:p>
@@ -11867,7 +11867,7 @@
           <a:p>
             <a:fld id="{5BCAD085-E8A6-8845-BD4E-CB4CCA059FC4}" type="datetimeFigureOut">
               <a:rPr lang="en-US" smtClean="0"/>
-              <a:t>4/10/25</a:t>
+              <a:t>4/11/25</a:t>
             </a:fld>
             <a:endParaRPr lang="en-US"/>
           </a:p>
@@ -12112,7 +12112,7 @@
           <a:p>
             <a:fld id="{5BCAD085-E8A6-8845-BD4E-CB4CCA059FC4}" type="datetimeFigureOut">
               <a:rPr lang="en-US" smtClean="0"/>
-              <a:t>4/10/25</a:t>
+              <a:t>4/11/25</a:t>
             </a:fld>
             <a:endParaRPr lang="en-US"/>
           </a:p>
@@ -12397,7 +12397,7 @@
           <a:p>
             <a:fld id="{5BCAD085-E8A6-8845-BD4E-CB4CCA059FC4}" type="datetimeFigureOut">
               <a:rPr lang="en-US" smtClean="0"/>
-              <a:t>4/10/25</a:t>
+              <a:t>4/11/25</a:t>
             </a:fld>
             <a:endParaRPr lang="en-US"/>
           </a:p>
@@ -12816,7 +12816,7 @@
           <a:p>
             <a:fld id="{5BCAD085-E8A6-8845-BD4E-CB4CCA059FC4}" type="datetimeFigureOut">
               <a:rPr lang="en-US" smtClean="0"/>
-              <a:t>4/10/25</a:t>
+              <a:t>4/11/25</a:t>
             </a:fld>
             <a:endParaRPr lang="en-US"/>
           </a:p>
@@ -12933,7 +12933,7 @@
           <a:p>
             <a:fld id="{5BCAD085-E8A6-8845-BD4E-CB4CCA059FC4}" type="datetimeFigureOut">
               <a:rPr lang="en-US" smtClean="0"/>
-              <a:t>4/10/25</a:t>
+              <a:t>4/11/25</a:t>
             </a:fld>
             <a:endParaRPr lang="en-US"/>
           </a:p>
@@ -13028,7 +13028,7 @@
           <a:p>
             <a:fld id="{5BCAD085-E8A6-8845-BD4E-CB4CCA059FC4}" type="datetimeFigureOut">
               <a:rPr lang="en-US" smtClean="0"/>
-              <a:t>4/10/25</a:t>
+              <a:t>4/11/25</a:t>
             </a:fld>
             <a:endParaRPr lang="en-US"/>
           </a:p>
@@ -13303,7 +13303,7 @@
           <a:p>
             <a:fld id="{5BCAD085-E8A6-8845-BD4E-CB4CCA059FC4}" type="datetimeFigureOut">
               <a:rPr lang="en-US" smtClean="0"/>
-              <a:t>4/10/25</a:t>
+              <a:t>4/11/25</a:t>
             </a:fld>
             <a:endParaRPr lang="en-US"/>
           </a:p>
@@ -13555,7 +13555,7 @@
           <a:p>
             <a:fld id="{5BCAD085-E8A6-8845-BD4E-CB4CCA059FC4}" type="datetimeFigureOut">
               <a:rPr lang="en-US" smtClean="0"/>
-              <a:t>4/10/25</a:t>
+              <a:t>4/11/25</a:t>
             </a:fld>
             <a:endParaRPr lang="en-US"/>
           </a:p>
@@ -13766,7 +13766,7 @@
           <a:p>
             <a:fld id="{5BCAD085-E8A6-8845-BD4E-CB4CCA059FC4}" type="datetimeFigureOut">
               <a:rPr lang="en-US" smtClean="0"/>
-              <a:t>4/10/25</a:t>
+              <a:t>4/11/25</a:t>
             </a:fld>
             <a:endParaRPr lang="en-US"/>
           </a:p>
@@ -17082,7 +17082,7 @@
         </p:blipFill>
         <p:spPr>
           <a:xfrm>
-            <a:off x="4969261" y="3277251"/>
+            <a:off x="5255010" y="3184760"/>
             <a:ext cx="2857500" cy="2857500"/>
           </a:xfrm>
           <a:prstGeom prst="rect">
@@ -17104,7 +17104,7 @@
         </p:nvSpPr>
         <p:spPr>
           <a:xfrm>
-            <a:off x="4572000" y="6134751"/>
+            <a:off x="4761695" y="6080798"/>
             <a:ext cx="3844129" cy="369332"/>
           </a:xfrm>
           <a:prstGeom prst="rect">
@@ -17143,10 +17143,10 @@
       </p:sp>
       <p:pic>
         <p:nvPicPr>
-          <p:cNvPr id="11" name="Picture 10" descr="A close-up of a logo&#10;&#10;AI-generated content may be incorrect.">
+          <p:cNvPr id="4" name="Picture 3" descr="A circular logo with a city silhouette&#10;&#10;AI-generated content may be incorrect.">
             <a:extLst>
               <a:ext uri="{FF2B5EF4-FFF2-40B4-BE49-F238E27FC236}">
-                <a16:creationId xmlns:a16="http://schemas.microsoft.com/office/drawing/2014/main" id="{FE18890D-3884-9AB9-CEDD-0D4922553443}"/>
+                <a16:creationId xmlns:a16="http://schemas.microsoft.com/office/drawing/2014/main" id="{EB68CC02-0ACE-A143-42DE-4F276399D3A2}"/>
               </a:ext>
             </a:extLst>
           </p:cNvPr>
@@ -17163,8 +17163,8 @@
         </p:blipFill>
         <p:spPr>
           <a:xfrm>
-            <a:off x="2125996" y="1567847"/>
-            <a:ext cx="7772400" cy="1506377"/>
+            <a:off x="4875617" y="40358"/>
+            <a:ext cx="3236893" cy="3236893"/>
           </a:xfrm>
           <a:prstGeom prst="rect">
             <a:avLst/>

</xml_diff>